<commit_message>
My section of the presentation is now complete.
I also edited the setup file to make running unit
tests easier.
</commit_message>
<xml_diff>
--- a/final_presentation/Presentation.pptx
+++ b/final_presentation/Presentation.pptx
@@ -3908,13 +3908,17 @@
         <p:spPr/>
         <p:txBody>
           <a:bodyPr>
-            <a:normAutofit fontScale="90000"/>
+            <a:normAutofit/>
           </a:bodyPr>
           <a:lstStyle/>
           <a:p>
             <a:r>
               <a:rPr lang="en-US" dirty="0" smtClean="0"/>
-              <a:t>Project Structure (Terrence’s Section)</a:t>
+              <a:t>Project </a:t>
+            </a:r>
+            <a:r>
+              <a:rPr lang="en-US" dirty="0" smtClean="0"/>
+              <a:t>Structure</a:t>
             </a:r>
             <a:endParaRPr lang="en-US" dirty="0"/>
           </a:p>
@@ -3935,7 +3939,50 @@
           <a:bodyPr/>
           <a:lstStyle/>
           <a:p>
-            <a:endParaRPr lang="en-US" dirty="0"/>
+            <a:r>
+              <a:rPr lang="en-US" dirty="0" err="1" smtClean="0"/>
+              <a:t>Lazer</a:t>
+            </a:r>
+            <a:r>
+              <a:rPr lang="en-US" dirty="0" smtClean="0"/>
+              <a:t> Blast uses the Python </a:t>
+            </a:r>
+            <a:r>
+              <a:rPr lang="en-US" dirty="0" err="1" smtClean="0"/>
+              <a:t>setuptools</a:t>
+            </a:r>
+            <a:r>
+              <a:rPr lang="en-US" dirty="0" smtClean="0"/>
+              <a:t> module, to make installation and development easier.</a:t>
+            </a:r>
+          </a:p>
+          <a:p>
+            <a:r>
+              <a:rPr lang="en-US" dirty="0" smtClean="0"/>
+              <a:t>It could easily be hosted on </a:t>
+            </a:r>
+            <a:r>
+              <a:rPr lang="en-US" dirty="0" err="1" smtClean="0"/>
+              <a:t>PypI</a:t>
+            </a:r>
+            <a:r>
+              <a:rPr lang="en-US" dirty="0" smtClean="0"/>
+              <a:t>, and users could install it just by typing `pip3 install </a:t>
+            </a:r>
+            <a:r>
+              <a:rPr lang="en-US" dirty="0" err="1" smtClean="0"/>
+              <a:t>lazer_blast</a:t>
+            </a:r>
+            <a:r>
+              <a:rPr lang="en-US" dirty="0" smtClean="0"/>
+              <a:t>`</a:t>
+            </a:r>
+          </a:p>
+          <a:p>
+            <a:r>
+              <a:rPr lang="en-US" dirty="0" smtClean="0"/>
+              <a:t>It also gives a common entry point for tests and requirements installation.</a:t>
+            </a:r>
           </a:p>
         </p:txBody>
       </p:sp>
@@ -4145,7 +4192,59 @@
           <a:p>
             <a:r>
               <a:rPr lang="en-US" dirty="0" smtClean="0"/>
-              <a:t>Base Classes</a:t>
+              <a:t>To help reduce duplication, we made two base classes: </a:t>
+            </a:r>
+            <a:r>
+              <a:rPr lang="en-US" dirty="0" err="1" smtClean="0"/>
+              <a:t>RenderedBase</a:t>
+            </a:r>
+            <a:r>
+              <a:rPr lang="en-US" dirty="0"/>
+              <a:t> </a:t>
+            </a:r>
+            <a:r>
+              <a:rPr lang="en-US" dirty="0" smtClean="0"/>
+              <a:t>and </a:t>
+            </a:r>
+            <a:r>
+              <a:rPr lang="en-US" dirty="0" err="1" smtClean="0"/>
+              <a:t>ActorBase</a:t>
+            </a:r>
+            <a:r>
+              <a:rPr lang="en-US" dirty="0" smtClean="0"/>
+              <a:t>.</a:t>
+            </a:r>
+          </a:p>
+          <a:p>
+            <a:r>
+              <a:rPr lang="en-US" dirty="0" smtClean="0"/>
+              <a:t>Anything  which is rendered will inherit from </a:t>
+            </a:r>
+            <a:r>
+              <a:rPr lang="en-US" dirty="0" err="1" smtClean="0"/>
+              <a:t>RenderedBase</a:t>
+            </a:r>
+            <a:r>
+              <a:rPr lang="en-US" dirty="0" smtClean="0"/>
+              <a:t>, and anything which </a:t>
+            </a:r>
+            <a:r>
+              <a:rPr lang="en-US" dirty="0" smtClean="0"/>
+              <a:t>has agency inherits from </a:t>
+            </a:r>
+            <a:r>
+              <a:rPr lang="en-US" dirty="0" err="1" smtClean="0"/>
+              <a:t>ActorBase</a:t>
+            </a:r>
+            <a:r>
+              <a:rPr lang="en-US" dirty="0" smtClean="0"/>
+              <a:t>.</a:t>
+            </a:r>
+          </a:p>
+          <a:p>
+            <a:r>
+              <a:rPr lang="en-US" dirty="0" smtClean="0"/>
+              <a:t>This also hides complexity from the API, and allows for easier use by later developers.</a:t>
             </a:r>
             <a:endParaRPr lang="en-US" dirty="0"/>
           </a:p>
@@ -4219,9 +4318,22 @@
           <a:bodyPr/>
           <a:lstStyle/>
           <a:p>
-            <a:pPr marL="0" indent="0">
-              <a:buNone/>
-            </a:pPr>
+            <a:r>
+              <a:rPr lang="en-US" dirty="0" smtClean="0"/>
+              <a:t>Our base classes, Player class and Enemy class all have unit tests for their main methods.</a:t>
+            </a:r>
+          </a:p>
+          <a:p>
+            <a:r>
+              <a:rPr lang="en-US" dirty="0" smtClean="0"/>
+              <a:t>This helped to reduce regression.</a:t>
+            </a:r>
+          </a:p>
+          <a:p>
+            <a:r>
+              <a:rPr lang="en-US" dirty="0" smtClean="0"/>
+              <a:t>It also provided an example of the expected use, and so helped when working as a team.</a:t>
+            </a:r>
             <a:endParaRPr lang="en-US" dirty="0"/>
           </a:p>
         </p:txBody>
@@ -4291,9 +4403,41 @@
         </p:nvSpPr>
         <p:spPr/>
         <p:txBody>
-          <a:bodyPr/>
-          <a:lstStyle/>
-          <a:p>
+          <a:bodyPr>
+            <a:normAutofit lnSpcReduction="10000"/>
+          </a:bodyPr>
+          <a:lstStyle/>
+          <a:p>
+            <a:r>
+              <a:rPr lang="en-US" dirty="0" smtClean="0"/>
+              <a:t>An additional improvement over </a:t>
+            </a:r>
+            <a:r>
+              <a:rPr lang="en-US" dirty="0" err="1" smtClean="0"/>
+              <a:t>Pylaga</a:t>
+            </a:r>
+            <a:r>
+              <a:rPr lang="en-US" dirty="0" smtClean="0"/>
+              <a:t> was the use of a settings file.</a:t>
+            </a:r>
+          </a:p>
+          <a:p>
+            <a:r>
+              <a:rPr lang="en-US" dirty="0" smtClean="0"/>
+              <a:t>Things such as key-bindings, spawn rates, speed and strength can easily be changed.</a:t>
+            </a:r>
+          </a:p>
+          <a:p>
+            <a:r>
+              <a:rPr lang="en-US" dirty="0" smtClean="0"/>
+              <a:t>This helped when performing usability testing, as updates could be made in real time.</a:t>
+            </a:r>
+          </a:p>
+          <a:p>
+            <a:r>
+              <a:rPr lang="en-US" dirty="0" smtClean="0"/>
+              <a:t>In the future we would move it to another format (like YAML or JSON) and allow all settings to be edited/saved through the GUI.</a:t>
+            </a:r>
             <a:endParaRPr lang="en-US" dirty="0"/>
           </a:p>
         </p:txBody>

</xml_diff>

<commit_message>
Update powerpoint for presentation
</commit_message>
<xml_diff>
--- a/final_presentation/Presentation.pptx
+++ b/final_presentation/Presentation.pptx
@@ -116,7 +116,7 @@
   </p:defaultTextStyle>
   <p:extLst>
     <p:ext uri="{EFAFB233-063F-42B5-8137-9DF3F51BA10A}">
-      <p15:sldGuideLst xmlns:p15="http://schemas.microsoft.com/office/powerpoint/2012/main" xmlns=""/>
+      <p15:sldGuideLst xmlns="" xmlns:p15="http://schemas.microsoft.com/office/powerpoint/2012/main"/>
     </p:ext>
   </p:extLst>
 </p:presentation>
@@ -204,7 +204,7 @@
           <a:p>
             <a:fld id="{EC39D051-DB48-D945-8FCA-B54E06EC6697}" type="datetimeFigureOut">
               <a:rPr lang="en-US" smtClean="0"/>
-              <a:t>4/12/17</a:t>
+              <a:t>4/20/17</a:t>
             </a:fld>
             <a:endParaRPr lang="en-US"/>
           </a:p>
@@ -1281,7 +1281,7 @@
           <a:p>
             <a:fld id="{48A87A34-81AB-432B-8DAE-1953F412C126}" type="datetimeFigureOut">
               <a:rPr lang="en-US" smtClean="0"/>
-              <a:t>4/12/17</a:t>
+              <a:t>4/20/17</a:t>
             </a:fld>
             <a:endParaRPr lang="en-US" dirty="0"/>
           </a:p>
@@ -1346,7 +1346,7 @@
   </p:clrMapOvr>
   <p:extLst>
     <p:ext uri="{DCECCB84-F9BA-43D5-87BE-67443E8EF086}">
-      <p15:sldGuideLst xmlns:p15="http://schemas.microsoft.com/office/powerpoint/2012/main" xmlns=""/>
+      <p15:sldGuideLst xmlns="" xmlns:p15="http://schemas.microsoft.com/office/powerpoint/2012/main"/>
     </p:ext>
   </p:extLst>
 </p:sldLayout>
@@ -1461,7 +1461,7 @@
           <a:p>
             <a:fld id="{48A87A34-81AB-432B-8DAE-1953F412C126}" type="datetimeFigureOut">
               <a:rPr lang="en-US" smtClean="0"/>
-              <a:t>4/12/17</a:t>
+              <a:t>4/20/17</a:t>
             </a:fld>
             <a:endParaRPr lang="en-US" dirty="0"/>
           </a:p>
@@ -1746,7 +1746,7 @@
             <a:fld id="{48A87A34-81AB-432B-8DAE-1953F412C126}" type="datetimeFigureOut">
               <a:rPr lang="en-US" smtClean="0"/>
               <a:pPr/>
-              <a:t>4/12/17</a:t>
+              <a:t>4/20/17</a:t>
             </a:fld>
             <a:endParaRPr lang="en-US" dirty="0"/>
           </a:p>
@@ -1811,7 +1811,7 @@
   </p:clrMapOvr>
   <p:extLst>
     <p:ext uri="{DCECCB84-F9BA-43D5-87BE-67443E8EF086}">
-      <p15:sldGuideLst xmlns:p15="http://schemas.microsoft.com/office/powerpoint/2012/main" xmlns=""/>
+      <p15:sldGuideLst xmlns="" xmlns:p15="http://schemas.microsoft.com/office/powerpoint/2012/main"/>
     </p:ext>
   </p:extLst>
 </p:sldLayout>
@@ -1988,7 +1988,7 @@
           <a:p>
             <a:fld id="{48A87A34-81AB-432B-8DAE-1953F412C126}" type="datetimeFigureOut">
               <a:rPr lang="en-US" smtClean="0"/>
-              <a:t>4/12/17</a:t>
+              <a:t>4/20/17</a:t>
             </a:fld>
             <a:endParaRPr lang="en-US" dirty="0"/>
           </a:p>
@@ -2043,7 +2043,7 @@
   </p:clrMapOvr>
   <p:extLst>
     <p:ext uri="{DCECCB84-F9BA-43D5-87BE-67443E8EF086}">
-      <p15:sldGuideLst xmlns:p15="http://schemas.microsoft.com/office/powerpoint/2012/main" xmlns=""/>
+      <p15:sldGuideLst xmlns="" xmlns:p15="http://schemas.microsoft.com/office/powerpoint/2012/main"/>
     </p:ext>
   </p:extLst>
 </p:sldLayout>
@@ -2367,7 +2367,7 @@
           <a:p>
             <a:fld id="{48A87A34-81AB-432B-8DAE-1953F412C126}" type="datetimeFigureOut">
               <a:rPr lang="en-US" smtClean="0"/>
-              <a:t>4/12/17</a:t>
+              <a:t>4/20/17</a:t>
             </a:fld>
             <a:endParaRPr lang="en-US" dirty="0"/>
           </a:p>
@@ -2422,7 +2422,7 @@
   </p:clrMapOvr>
   <p:extLst>
     <p:ext uri="{DCECCB84-F9BA-43D5-87BE-67443E8EF086}">
-      <p15:sldGuideLst xmlns:p15="http://schemas.microsoft.com/office/powerpoint/2012/main" xmlns=""/>
+      <p15:sldGuideLst xmlns="" xmlns:p15="http://schemas.microsoft.com/office/powerpoint/2012/main"/>
     </p:ext>
   </p:extLst>
 </p:sldLayout>
@@ -2485,7 +2485,7 @@
           <a:p>
             <a:fld id="{48A87A34-81AB-432B-8DAE-1953F412C126}" type="datetimeFigureOut">
               <a:rPr lang="en-US" smtClean="0"/>
-              <a:t>4/12/17</a:t>
+              <a:t>4/20/17</a:t>
             </a:fld>
             <a:endParaRPr lang="en-US" dirty="0"/>
           </a:p>
@@ -2575,7 +2575,7 @@
           <a:p>
             <a:fld id="{48A87A34-81AB-432B-8DAE-1953F412C126}" type="datetimeFigureOut">
               <a:rPr lang="en-US" smtClean="0"/>
-              <a:t>4/12/17</a:t>
+              <a:t>4/20/17</a:t>
             </a:fld>
             <a:endParaRPr lang="en-US" dirty="0"/>
           </a:p>
@@ -2920,7 +2920,7 @@
           <a:p>
             <a:fld id="{48A87A34-81AB-432B-8DAE-1953F412C126}" type="datetimeFigureOut">
               <a:rPr lang="en-US" smtClean="0"/>
-              <a:t>4/12/17</a:t>
+              <a:t>4/20/17</a:t>
             </a:fld>
             <a:endParaRPr lang="en-US" dirty="0"/>
           </a:p>
@@ -2975,7 +2975,7 @@
   </p:clrMapOvr>
   <p:extLst>
     <p:ext uri="{DCECCB84-F9BA-43D5-87BE-67443E8EF086}">
-      <p15:sldGuideLst xmlns:p15="http://schemas.microsoft.com/office/powerpoint/2012/main" xmlns=""/>
+      <p15:sldGuideLst xmlns="" xmlns:p15="http://schemas.microsoft.com/office/powerpoint/2012/main"/>
     </p:ext>
   </p:extLst>
 </p:sldLayout>
@@ -3177,7 +3177,7 @@
           <a:p>
             <a:fld id="{48A87A34-81AB-432B-8DAE-1953F412C126}" type="datetimeFigureOut">
               <a:rPr lang="en-US" smtClean="0"/>
-              <a:t>4/12/17</a:t>
+              <a:t>4/20/17</a:t>
             </a:fld>
             <a:endParaRPr lang="en-US" dirty="0"/>
           </a:p>
@@ -3429,7 +3429,7 @@
           <a:p>
             <a:fld id="{4D9FFFB4-400D-1240-AB24-6F86C96D4DFB}" type="datetimeFigureOut">
               <a:rPr lang="en-US" smtClean="0"/>
-              <a:t>4/12/17</a:t>
+              <a:t>4/20/17</a:t>
             </a:fld>
             <a:endParaRPr lang="en-US" dirty="0"/>
           </a:p>
@@ -3656,7 +3656,7 @@
           <a:p>
             <a:fld id="{E28077EF-3DB9-4852-A8C8-9AA18A70A9F8}" type="datetimeFigureOut">
               <a:rPr lang="en-US" smtClean="0"/>
-              <a:t>4/12/17</a:t>
+              <a:t>4/20/17</a:t>
             </a:fld>
             <a:endParaRPr lang="en-US" dirty="0"/>
           </a:p>
@@ -3962,7 +3962,7 @@
           <a:p>
             <a:fld id="{E28077EF-3DB9-4852-A8C8-9AA18A70A9F8}" type="datetimeFigureOut">
               <a:rPr lang="en-US" smtClean="0"/>
-              <a:t>4/12/17</a:t>
+              <a:t>4/20/17</a:t>
             </a:fld>
             <a:endParaRPr lang="en-US" dirty="0"/>
           </a:p>
@@ -4431,7 +4431,7 @@
           <a:p>
             <a:fld id="{E28077EF-3DB9-4852-A8C8-9AA18A70A9F8}" type="datetimeFigureOut">
               <a:rPr lang="en-US" smtClean="0"/>
-              <a:t>4/12/17</a:t>
+              <a:t>4/20/17</a:t>
             </a:fld>
             <a:endParaRPr lang="en-US" dirty="0"/>
           </a:p>
@@ -4974,7 +4974,7 @@
           <a:p>
             <a:fld id="{4D9FFFB4-400D-1240-AB24-6F86C96D4DFB}" type="datetimeFigureOut">
               <a:rPr lang="en-US" smtClean="0"/>
-              <a:t>4/12/17</a:t>
+              <a:t>4/20/17</a:t>
             </a:fld>
             <a:endParaRPr lang="en-US" dirty="0"/>
           </a:p>
@@ -5744,7 +5744,7 @@
           <a:p>
             <a:fld id="{4D9FFFB4-400D-1240-AB24-6F86C96D4DFB}" type="datetimeFigureOut">
               <a:rPr lang="en-US" smtClean="0"/>
-              <a:t>4/12/17</a:t>
+              <a:t>4/20/17</a:t>
             </a:fld>
             <a:endParaRPr lang="en-US" dirty="0"/>
           </a:p>
@@ -5915,7 +5915,7 @@
           <a:p>
             <a:fld id="{48A87A34-81AB-432B-8DAE-1953F412C126}" type="datetimeFigureOut">
               <a:rPr lang="en-US" smtClean="0"/>
-              <a:t>4/12/17</a:t>
+              <a:t>4/20/17</a:t>
             </a:fld>
             <a:endParaRPr lang="en-US" dirty="0"/>
           </a:p>
@@ -6134,7 +6134,7 @@
             <a:fld id="{48A87A34-81AB-432B-8DAE-1953F412C126}" type="datetimeFigureOut">
               <a:rPr lang="en-US" smtClean="0"/>
               <a:pPr/>
-              <a:t>4/12/17</a:t>
+              <a:t>4/20/17</a:t>
             </a:fld>
             <a:endParaRPr lang="en-US" dirty="0"/>
           </a:p>
@@ -6199,7 +6199,7 @@
   </p:clrMapOvr>
   <p:extLst>
     <p:ext uri="{DCECCB84-F9BA-43D5-87BE-67443E8EF086}">
-      <p15:sldGuideLst xmlns:p15="http://schemas.microsoft.com/office/powerpoint/2012/main" xmlns=""/>
+      <p15:sldGuideLst xmlns="" xmlns:p15="http://schemas.microsoft.com/office/powerpoint/2012/main"/>
     </p:ext>
   </p:extLst>
 </p:sldLayout>
@@ -7831,7 +7831,7 @@
             <a:fld id="{48A87A34-81AB-432B-8DAE-1953F412C126}" type="datetimeFigureOut">
               <a:rPr lang="en-US" dirty="0"/>
               <a:pPr/>
-              <a:t>4/12/17</a:t>
+              <a:t>4/20/17</a:t>
             </a:fld>
             <a:endParaRPr lang="en-US" dirty="0"/>
           </a:p>
@@ -8225,7 +8225,7 @@
   </p:txStyles>
   <p:extLst>
     <p:ext uri="{27BBF7A9-308A-43DC-89C8-2F10F3537804}">
-      <p15:sldGuideLst xmlns:p15="http://schemas.microsoft.com/office/powerpoint/2012/main" xmlns=""/>
+      <p15:sldGuideLst xmlns="" xmlns:p15="http://schemas.microsoft.com/office/powerpoint/2012/main"/>
     </p:ext>
   </p:extLst>
 </p:sldMaster>
@@ -8289,9 +8289,11 @@
               </a:lnSpc>
             </a:pPr>
             <a:r>
-              <a:rPr lang="en-CA" sz="4400" b="0" strike="noStrike" spc="-1">
-                <a:solidFill>
-                  <a:srgbClr val="FFFFFF"/>
+              <a:rPr lang="en-CA" sz="4400" b="0" strike="noStrike" spc="-1" dirty="0" err="1">
+                <a:solidFill>
+                  <a:schemeClr val="bg1">
+                    <a:lumMod val="95000"/>
+                  </a:schemeClr>
                 </a:solidFill>
                 <a:uFill>
                   <a:solidFill>
@@ -8303,9 +8305,11 @@
               </a:rPr>
               <a:t>LazerBlast</a:t>
             </a:r>
-            <a:endParaRPr lang="en-CA" sz="1800" b="0" strike="noStrike" spc="-1">
+            <a:endParaRPr lang="en-CA" sz="1800" b="0" strike="noStrike" spc="-1" dirty="0">
               <a:solidFill>
-                <a:srgbClr val="FFFFFF"/>
+                <a:schemeClr val="bg1">
+                  <a:lumMod val="95000"/>
+                </a:schemeClr>
               </a:solidFill>
               <a:uFill>
                 <a:solidFill>
@@ -8358,9 +8362,9 @@
               </a:lnSpc>
             </a:pPr>
             <a:r>
-              <a:rPr lang="en-CA" sz="3200" b="0" strike="noStrike" spc="-1">
-                <a:solidFill>
-                  <a:srgbClr val="FFFFFF"/>
+              <a:rPr lang="en-CA" sz="3200" b="0" strike="noStrike" spc="-1" dirty="0">
+                <a:solidFill>
+                  <a:srgbClr val="F2F2F2"/>
                 </a:solidFill>
                 <a:uFill>
                   <a:solidFill>
@@ -8370,11 +8374,26 @@
                 <a:latin typeface="Calibri"/>
                 <a:ea typeface="DejaVu Sans"/>
               </a:rPr>
-              <a:t>An Improvement on Pylaga</a:t>
-            </a:r>
-            <a:endParaRPr lang="en-CA" sz="1800" b="0" strike="noStrike" spc="-1">
+              <a:t>An Improvement on </a:t>
+            </a:r>
+            <a:r>
+              <a:rPr lang="en-CA" sz="3200" b="0" strike="noStrike" spc="-1" dirty="0" err="1">
+                <a:solidFill>
+                  <a:srgbClr val="F2F2F2"/>
+                </a:solidFill>
+                <a:uFill>
+                  <a:solidFill>
+                    <a:srgbClr val="FFFFFF"/>
+                  </a:solidFill>
+                </a:uFill>
+                <a:latin typeface="Calibri"/>
+                <a:ea typeface="DejaVu Sans"/>
+              </a:rPr>
+              <a:t>Pylaga</a:t>
+            </a:r>
+            <a:endParaRPr lang="en-CA" sz="1800" b="0" strike="noStrike" spc="-1" dirty="0">
               <a:solidFill>
-                <a:srgbClr val="FFFFFF"/>
+                <a:srgbClr val="F2F2F2"/>
               </a:solidFill>
               <a:uFill>
                 <a:solidFill>
@@ -8481,7 +8500,7 @@
             <a:r>
               <a:rPr lang="en-CA" sz="4400" b="0" strike="noStrike" spc="-1" dirty="0">
                 <a:solidFill>
-                  <a:srgbClr val="FFFFFF"/>
+                  <a:srgbClr val="F2F2F2"/>
                 </a:solidFill>
                 <a:uFill>
                   <a:solidFill>
@@ -8495,7 +8514,7 @@
             </a:r>
             <a:endParaRPr lang="en-CA" sz="1800" b="0" strike="noStrike" spc="-1" dirty="0">
               <a:solidFill>
-                <a:srgbClr val="FFFFFF"/>
+                <a:srgbClr val="F2F2F2"/>
               </a:solidFill>
               <a:uFill>
                 <a:solidFill>
@@ -8516,7 +8535,7 @@
         <p:spPr>
           <a:xfrm>
             <a:off x="457200" y="1600200"/>
-            <a:ext cx="8226360" cy="4522680"/>
+            <a:ext cx="8226360" cy="3561222"/>
           </a:xfrm>
           <a:prstGeom prst="rect">
             <a:avLst/>
@@ -8546,6 +8565,9 @@
               <a:lnSpc>
                 <a:spcPct val="100000"/>
               </a:lnSpc>
+              <a:spcAft>
+                <a:spcPts val="1200"/>
+              </a:spcAft>
               <a:buClr>
                 <a:srgbClr val="FFFFFF"/>
               </a:buClr>
@@ -8553,74 +8575,9 @@
               <a:buChar char="•"/>
             </a:pPr>
             <a:r>
-              <a:rPr lang="en-CA" sz="3200" spc="-1" dirty="0">
-                <a:solidFill>
-                  <a:srgbClr val="FFFFFF"/>
-                </a:solidFill>
-                <a:uFill>
-                  <a:solidFill>
-                    <a:srgbClr val="FFFFFF"/>
-                  </a:solidFill>
-                </a:uFill>
-                <a:latin typeface="Calibri"/>
-              </a:rPr>
-              <a:t>Create a video game in the same spirit as arcade top-down shooters like </a:t>
-            </a:r>
-            <a:r>
-              <a:rPr lang="en-CA" sz="3200" spc="-1" dirty="0" err="1" smtClean="0">
-                <a:solidFill>
-                  <a:srgbClr val="FFFFFF"/>
-                </a:solidFill>
-                <a:uFill>
-                  <a:solidFill>
-                    <a:srgbClr val="FFFFFF"/>
-                  </a:solidFill>
-                </a:uFill>
-                <a:latin typeface="Calibri"/>
-              </a:rPr>
-              <a:t>Galaga</a:t>
-            </a:r>
-            <a:r>
-              <a:rPr lang="en-CA" sz="3200" spc="-1" dirty="0" smtClean="0">
-                <a:solidFill>
-                  <a:srgbClr val="FFFFFF"/>
-                </a:solidFill>
-                <a:uFill>
-                  <a:solidFill>
-                    <a:srgbClr val="FFFFFF"/>
-                  </a:solidFill>
-                </a:uFill>
-                <a:latin typeface="Calibri"/>
-              </a:rPr>
-              <a:t>.</a:t>
-            </a:r>
-            <a:endParaRPr lang="en-CA" sz="1800" b="0" strike="noStrike" spc="-1" dirty="0">
-              <a:solidFill>
-                <a:srgbClr val="FFFFFF"/>
-              </a:solidFill>
-              <a:uFill>
-                <a:solidFill>
-                  <a:srgbClr val="FFFFFF"/>
-                </a:solidFill>
-              </a:uFill>
-              <a:latin typeface="Arial"/>
-            </a:endParaRPr>
-          </a:p>
-          <a:p>
-            <a:pPr marL="343080" indent="-339840">
-              <a:lnSpc>
-                <a:spcPct val="100000"/>
-              </a:lnSpc>
-              <a:buClr>
-                <a:srgbClr val="FFFFFF"/>
-              </a:buClr>
-              <a:buFont typeface="Arial"/>
-              <a:buChar char="•"/>
-            </a:pPr>
-            <a:r>
-              <a:rPr lang="en-CA" sz="3200" b="0" strike="noStrike" spc="-1" dirty="0">
-                <a:solidFill>
-                  <a:srgbClr val="FFFFFF"/>
+              <a:rPr lang="en-CA" sz="2800" spc="-1" dirty="0" smtClean="0">
+                <a:solidFill>
+                  <a:srgbClr val="F2F2F2"/>
                 </a:solidFill>
                 <a:uFill>
                   <a:solidFill>
@@ -8630,12 +8587,24 @@
                 <a:latin typeface="Calibri"/>
                 <a:ea typeface="DejaVu Sans"/>
               </a:rPr>
-              <a:t>Add challenge of </a:t>
-            </a:r>
-            <a:r>
-              <a:rPr lang="en-CA" sz="3200" spc="-1" dirty="0">
-                <a:solidFill>
-                  <a:srgbClr val="FFFFFF"/>
+              <a:t>We had two main improvements that we wanted to make:</a:t>
+            </a:r>
+          </a:p>
+          <a:p>
+            <a:pPr marL="800280" lvl="1" indent="-339840">
+              <a:spcAft>
+                <a:spcPts val="1200"/>
+              </a:spcAft>
+              <a:buClr>
+                <a:srgbClr val="FFFFFF"/>
+              </a:buClr>
+              <a:buFont typeface="Arial"/>
+              <a:buChar char="•"/>
+            </a:pPr>
+            <a:r>
+              <a:rPr lang="en-CA" sz="2800" spc="-1" dirty="0" smtClean="0">
+                <a:solidFill>
+                  <a:srgbClr val="F2F2F2"/>
                 </a:solidFill>
                 <a:uFill>
                   <a:solidFill>
@@ -8645,12 +8614,36 @@
                 <a:latin typeface="Calibri"/>
                 <a:ea typeface="DejaVu Sans"/>
               </a:rPr>
-              <a:t>multiple enemy types that require color matching laser hits to </a:t>
-            </a:r>
-            <a:r>
-              <a:rPr lang="en-CA" sz="3200" spc="-1" dirty="0" smtClean="0">
+              <a:t>Add a color changing-component to arcade-like shooters.</a:t>
+            </a:r>
+            <a:endParaRPr lang="en-CA" sz="2800" spc="-1" dirty="0">
+              <a:solidFill>
+                <a:srgbClr val="F2F2F2"/>
+              </a:solidFill>
+              <a:uFill>
                 <a:solidFill>
                   <a:srgbClr val="FFFFFF"/>
+                </a:solidFill>
+              </a:uFill>
+              <a:latin typeface="Calibri"/>
+              <a:ea typeface="DejaVu Sans"/>
+            </a:endParaRPr>
+          </a:p>
+          <a:p>
+            <a:pPr marL="800280" lvl="1" indent="-339840">
+              <a:spcAft>
+                <a:spcPts val="1200"/>
+              </a:spcAft>
+              <a:buClr>
+                <a:srgbClr val="FFFFFF"/>
+              </a:buClr>
+              <a:buFont typeface="Arial"/>
+              <a:buChar char="•"/>
+            </a:pPr>
+            <a:r>
+              <a:rPr lang="en-CA" sz="2800" spc="-1" dirty="0" smtClean="0">
+                <a:solidFill>
+                  <a:srgbClr val="F2F2F2"/>
                 </a:solidFill>
                 <a:uFill>
                   <a:solidFill>
@@ -8660,12 +8653,12 @@
                 <a:latin typeface="Calibri"/>
                 <a:ea typeface="DejaVu Sans"/>
               </a:rPr>
-              <a:t>destroy.  Specifically, we aimed to improve upon the open-source game, </a:t>
-            </a:r>
-            <a:r>
-              <a:rPr lang="en-CA" sz="3200" spc="-1" dirty="0" err="1" smtClean="0">
-                <a:solidFill>
-                  <a:srgbClr val="FFFFFF"/>
+              <a:t>Follow </a:t>
+            </a:r>
+            <a:r>
+              <a:rPr lang="en-CA" sz="2800" spc="-1" dirty="0">
+                <a:solidFill>
+                  <a:srgbClr val="F2F2F2"/>
                 </a:solidFill>
                 <a:uFill>
                   <a:solidFill>
@@ -8675,12 +8668,12 @@
                 <a:latin typeface="Calibri"/>
                 <a:ea typeface="DejaVu Sans"/>
               </a:rPr>
-              <a:t>Pylaga</a:t>
-            </a:r>
-            <a:r>
-              <a:rPr lang="en-CA" sz="3200" spc="-1" dirty="0" smtClean="0">
-                <a:solidFill>
-                  <a:srgbClr val="FFFFFF"/>
+              <a:t>standard practices for Python modules, and make the game extensible for later developers</a:t>
+            </a:r>
+            <a:r>
+              <a:rPr lang="en-CA" sz="2800" spc="-1" dirty="0" smtClean="0">
+                <a:solidFill>
+                  <a:srgbClr val="F2F2F2"/>
                 </a:solidFill>
                 <a:uFill>
                   <a:solidFill>
@@ -8690,38 +8683,11 @@
                 <a:latin typeface="Calibri"/>
                 <a:ea typeface="DejaVu Sans"/>
               </a:rPr>
-              <a:t>.</a:t>
-            </a:r>
-          </a:p>
-          <a:p>
-            <a:pPr marL="343080" indent="-339840">
-              <a:lnSpc>
-                <a:spcPct val="100000"/>
-              </a:lnSpc>
-              <a:buClr>
-                <a:srgbClr val="FFFFFF"/>
-              </a:buClr>
-              <a:buFont typeface="Arial"/>
-              <a:buChar char="•"/>
-            </a:pPr>
-            <a:r>
-              <a:rPr lang="en-CA" sz="3200" spc="-1" dirty="0" smtClean="0">
-                <a:solidFill>
-                  <a:srgbClr val="FFFFFF"/>
-                </a:solidFill>
-                <a:uFill>
-                  <a:solidFill>
-                    <a:srgbClr val="FFFFFF"/>
-                  </a:solidFill>
-                </a:uFill>
-                <a:latin typeface="Calibri"/>
-                <a:ea typeface="DejaVu Sans"/>
-              </a:rPr>
-              <a:t>Follow standard practices for Python modules, and make the game extensible for later developers.</a:t>
-            </a:r>
-            <a:endParaRPr lang="en-CA" sz="3200" spc="-1" dirty="0">
+              <a:t>.*</a:t>
+            </a:r>
+            <a:endParaRPr lang="en-CA" sz="2800" spc="-1" dirty="0">
               <a:solidFill>
-                <a:srgbClr val="FFFFFF"/>
+                <a:srgbClr val="F2F2F2"/>
               </a:solidFill>
               <a:uFill>
                 <a:solidFill>
@@ -8731,6 +8697,62 @@
               <a:latin typeface="Calibri"/>
               <a:ea typeface="DejaVu Sans"/>
             </a:endParaRPr>
+          </a:p>
+          <a:p>
+            <a:pPr marL="3240">
+              <a:lnSpc>
+                <a:spcPct val="100000"/>
+              </a:lnSpc>
+              <a:spcAft>
+                <a:spcPts val="1200"/>
+              </a:spcAft>
+              <a:buClr>
+                <a:srgbClr val="FFFFFF"/>
+              </a:buClr>
+            </a:pPr>
+            <a:endParaRPr lang="en-CA" sz="3200" spc="-1" dirty="0">
+              <a:solidFill>
+                <a:srgbClr val="F2F2F2"/>
+              </a:solidFill>
+              <a:uFill>
+                <a:solidFill>
+                  <a:srgbClr val="FFFFFF"/>
+                </a:solidFill>
+              </a:uFill>
+              <a:latin typeface="Calibri"/>
+              <a:ea typeface="DejaVu Sans"/>
+            </a:endParaRPr>
+          </a:p>
+        </p:txBody>
+      </p:sp>
+      <p:sp>
+        <p:nvSpPr>
+          <p:cNvPr id="2" name="TextBox 1"/>
+          <p:cNvSpPr txBox="1"/>
+          <p:nvPr/>
+        </p:nvSpPr>
+        <p:spPr>
+          <a:xfrm>
+            <a:off x="457200" y="5899426"/>
+            <a:ext cx="6312545" cy="369332"/>
+          </a:xfrm>
+          <a:prstGeom prst="rect">
+            <a:avLst/>
+          </a:prstGeom>
+          <a:noFill/>
+        </p:spPr>
+        <p:txBody>
+          <a:bodyPr wrap="none" rtlCol="0">
+            <a:spAutoFit/>
+          </a:bodyPr>
+          <a:lstStyle/>
+          <a:p>
+            <a:pPr algn="ctr"/>
+            <a:r>
+              <a:rPr lang="en-US" dirty="0" smtClean="0"/>
+              <a:t>*This improvement will be the topic of this presentation. </a:t>
+            </a:r>
+            <a:endParaRPr lang="en-US" dirty="0"/>
           </a:p>
         </p:txBody>
       </p:sp>
@@ -8829,7 +8851,7 @@
             <a:r>
               <a:rPr lang="en-CA" sz="4400" spc="-1" dirty="0">
                 <a:solidFill>
-                  <a:srgbClr val="FFFFFF"/>
+                  <a:srgbClr val="F2F2F2"/>
                 </a:solidFill>
                 <a:uFill>
                   <a:solidFill>
@@ -8842,7 +8864,7 @@
             </a:r>
             <a:endParaRPr lang="en-CA" sz="1800" b="0" strike="noStrike" spc="-1" dirty="0">
               <a:solidFill>
-                <a:srgbClr val="FFFFFF"/>
+                <a:srgbClr val="F2F2F2"/>
               </a:solidFill>
               <a:uFill>
                 <a:solidFill>
@@ -8893,6 +8915,9 @@
               <a:lnSpc>
                 <a:spcPct val="100000"/>
               </a:lnSpc>
+              <a:spcAft>
+                <a:spcPts val="1200"/>
+              </a:spcAft>
               <a:buClr>
                 <a:srgbClr val="FFFFFF"/>
               </a:buClr>
@@ -8900,9 +8925,9 @@
               <a:buChar char="•"/>
             </a:pPr>
             <a:r>
-              <a:rPr lang="en-CA" sz="3200" spc="-1" dirty="0" smtClean="0">
-                <a:solidFill>
-                  <a:srgbClr val="FFFFFF"/>
+              <a:rPr lang="en-CA" sz="2800" spc="-1" dirty="0" smtClean="0">
+                <a:solidFill>
+                  <a:srgbClr val="F2F2F2"/>
                 </a:solidFill>
                 <a:uFill>
                   <a:solidFill>
@@ -8915,9 +8940,9 @@
               <a:t>Written in Python using the </a:t>
             </a:r>
             <a:r>
-              <a:rPr lang="en-CA" sz="3200" spc="-1" dirty="0" err="1" smtClean="0">
-                <a:solidFill>
-                  <a:srgbClr val="FFFFFF"/>
+              <a:rPr lang="en-CA" sz="2800" spc="-1" dirty="0" err="1" smtClean="0">
+                <a:solidFill>
+                  <a:srgbClr val="F2F2F2"/>
                 </a:solidFill>
                 <a:uFill>
                   <a:solidFill>
@@ -8930,9 +8955,9 @@
               <a:t>PyGame</a:t>
             </a:r>
             <a:r>
-              <a:rPr lang="en-CA" sz="3200" spc="-1" dirty="0" smtClean="0">
-                <a:solidFill>
-                  <a:srgbClr val="FFFFFF"/>
+              <a:rPr lang="en-CA" sz="2800" spc="-1" dirty="0" smtClean="0">
+                <a:solidFill>
+                  <a:srgbClr val="F2F2F2"/>
                 </a:solidFill>
                 <a:uFill>
                   <a:solidFill>
@@ -8944,9 +8969,9 @@
               </a:rPr>
               <a:t> library.</a:t>
             </a:r>
-            <a:endParaRPr lang="en-CA" sz="3200" spc="-1" dirty="0">
+            <a:endParaRPr lang="en-CA" sz="2800" spc="-1" dirty="0">
               <a:solidFill>
-                <a:srgbClr val="FFFFFF"/>
+                <a:srgbClr val="F2F2F2"/>
               </a:solidFill>
               <a:uFill>
                 <a:solidFill>
@@ -8962,6 +8987,9 @@
               <a:lnSpc>
                 <a:spcPct val="100000"/>
               </a:lnSpc>
+              <a:spcAft>
+                <a:spcPts val="1200"/>
+              </a:spcAft>
               <a:buClr>
                 <a:srgbClr val="FFFFFF"/>
               </a:buClr>
@@ -8969,9 +8997,9 @@
               <a:buChar char="•"/>
             </a:pPr>
             <a:r>
-              <a:rPr lang="en-CA" sz="3200" b="0" strike="noStrike" spc="-1" dirty="0" smtClean="0">
-                <a:solidFill>
-                  <a:srgbClr val="FFFFFF"/>
+              <a:rPr lang="en-CA" sz="2800" b="0" strike="noStrike" spc="-1" dirty="0" smtClean="0">
+                <a:solidFill>
+                  <a:srgbClr val="F2F2F2"/>
                 </a:solidFill>
                 <a:uFill>
                   <a:solidFill>
@@ -8983,9 +9011,9 @@
               <a:t>Python was chosen because of its widespread use, the availability of open-source components on </a:t>
             </a:r>
             <a:r>
-              <a:rPr lang="en-CA" sz="3200" b="0" strike="noStrike" spc="-1" dirty="0" err="1" smtClean="0">
-                <a:solidFill>
-                  <a:srgbClr val="FFFFFF"/>
+              <a:rPr lang="en-CA" sz="2800" b="0" strike="noStrike" spc="-1" dirty="0" err="1" smtClean="0">
+                <a:solidFill>
+                  <a:srgbClr val="F2F2F2"/>
                 </a:solidFill>
                 <a:uFill>
                   <a:solidFill>
@@ -8997,9 +9025,9 @@
               <a:t>PyPI</a:t>
             </a:r>
             <a:r>
-              <a:rPr lang="en-CA" sz="3200" spc="-1" dirty="0" smtClean="0">
-                <a:solidFill>
-                  <a:srgbClr val="FFFFFF"/>
+              <a:rPr lang="en-CA" sz="2800" spc="-1" dirty="0" smtClean="0">
+                <a:solidFill>
+                  <a:srgbClr val="F2F2F2"/>
                 </a:solidFill>
                 <a:uFill>
                   <a:solidFill>
@@ -9008,11 +9036,140 @@
                 </a:uFill>
                 <a:latin typeface="Calibri"/>
               </a:rPr>
-              <a:t>, and the ease with which modules can be packaged and released.</a:t>
-            </a:r>
-            <a:endParaRPr lang="en-CA" sz="3200" b="0" strike="noStrike" spc="-1" dirty="0">
+              <a:t>, and the ease with which modules can be packaged and released</a:t>
+            </a:r>
+            <a:r>
+              <a:rPr lang="en-CA" sz="2800" spc="-1" dirty="0" smtClean="0">
+                <a:solidFill>
+                  <a:srgbClr val="F2F2F2"/>
+                </a:solidFill>
+                <a:uFill>
+                  <a:solidFill>
+                    <a:srgbClr val="FFFFFF"/>
+                  </a:solidFill>
+                </a:uFill>
+                <a:latin typeface="Calibri"/>
+              </a:rPr>
+              <a:t>.</a:t>
+            </a:r>
+          </a:p>
+          <a:p>
+            <a:pPr marL="800280" lvl="1" indent="-339840">
+              <a:spcAft>
+                <a:spcPts val="1200"/>
+              </a:spcAft>
+              <a:buClr>
+                <a:srgbClr val="FFFFFF"/>
+              </a:buClr>
+              <a:buFont typeface="Arial"/>
+              <a:buChar char="•"/>
+            </a:pPr>
+            <a:r>
+              <a:rPr lang="en-CA" sz="2800" b="0" strike="noStrike" spc="-1" dirty="0" err="1" smtClean="0">
+                <a:solidFill>
+                  <a:srgbClr val="F2F2F2"/>
+                </a:solidFill>
+                <a:uFill>
+                  <a:solidFill>
+                    <a:srgbClr val="FFFFFF"/>
+                  </a:solidFill>
+                </a:uFill>
+                <a:latin typeface="Calibri"/>
+              </a:rPr>
+              <a:t>Pylaga</a:t>
+            </a:r>
+            <a:r>
+              <a:rPr lang="en-CA" sz="2800" b="0" strike="noStrike" spc="-1" dirty="0" smtClean="0">
+                <a:solidFill>
+                  <a:srgbClr val="F2F2F2"/>
+                </a:solidFill>
+                <a:uFill>
+                  <a:solidFill>
+                    <a:srgbClr val="FFFFFF"/>
+                  </a:solidFill>
+                </a:uFill>
+                <a:latin typeface="Calibri"/>
+              </a:rPr>
+              <a:t> did not take advantage of </a:t>
+            </a:r>
+            <a:r>
+              <a:rPr lang="en-CA" sz="2800" b="0" strike="noStrike" spc="-1" dirty="0" err="1" smtClean="0">
+                <a:solidFill>
+                  <a:srgbClr val="F2F2F2"/>
+                </a:solidFill>
+                <a:uFill>
+                  <a:solidFill>
+                    <a:srgbClr val="FFFFFF"/>
+                  </a:solidFill>
+                </a:uFill>
+                <a:latin typeface="Calibri"/>
+              </a:rPr>
+              <a:t>PyPI</a:t>
+            </a:r>
+            <a:r>
+              <a:rPr lang="en-CA" sz="2800" b="0" strike="noStrike" spc="-1" dirty="0" smtClean="0">
+                <a:solidFill>
+                  <a:srgbClr val="F2F2F2"/>
+                </a:solidFill>
+                <a:uFill>
+                  <a:solidFill>
+                    <a:srgbClr val="FFFFFF"/>
+                  </a:solidFill>
+                </a:uFill>
+                <a:latin typeface="Calibri"/>
+              </a:rPr>
+              <a:t>, or the python’s </a:t>
+            </a:r>
+            <a:r>
+              <a:rPr lang="en-CA" sz="2800" b="0" strike="noStrike" spc="-1" dirty="0" err="1" smtClean="0">
+                <a:solidFill>
+                  <a:schemeClr val="tx1">
+                    <a:lumMod val="95000"/>
+                  </a:schemeClr>
+                </a:solidFill>
+                <a:uFill>
+                  <a:solidFill>
+                    <a:srgbClr val="FFFFFF"/>
+                  </a:solidFill>
+                </a:uFill>
+                <a:latin typeface="Andale Mono"/>
+                <a:cs typeface="Andale Mono"/>
+              </a:rPr>
+              <a:t>setup_utils</a:t>
+            </a:r>
+            <a:r>
+              <a:rPr lang="en-CA" sz="2800" b="0" strike="noStrike" spc="-1" dirty="0" smtClean="0">
+                <a:solidFill>
+                  <a:schemeClr val="tx1">
+                    <a:lumMod val="95000"/>
+                  </a:schemeClr>
+                </a:solidFill>
+                <a:uFill>
+                  <a:solidFill>
+                    <a:srgbClr val="FFFFFF"/>
+                  </a:solidFill>
+                </a:uFill>
+                <a:latin typeface="Calibri"/>
+              </a:rPr>
+              <a:t> </a:t>
+            </a:r>
+            <a:r>
+              <a:rPr lang="en-CA" sz="2800" b="0" strike="noStrike" spc="-1" dirty="0" smtClean="0">
+                <a:solidFill>
+                  <a:srgbClr val="F2F2F2"/>
+                </a:solidFill>
+                <a:uFill>
+                  <a:solidFill>
+                    <a:srgbClr val="FFFFFF"/>
+                  </a:solidFill>
+                </a:uFill>
+                <a:latin typeface="Calibri"/>
+              </a:rPr>
+              <a:t>module.</a:t>
+            </a:r>
+            <a:endParaRPr lang="en-CA" sz="2800" b="0" strike="noStrike" spc="-1" dirty="0">
               <a:solidFill>
-                <a:srgbClr val="FFFFFF"/>
+                <a:srgbClr val="F2F2F2"/>
               </a:solidFill>
               <a:uFill>
                 <a:solidFill>
@@ -9119,7 +9276,7 @@
             <a:r>
               <a:rPr lang="en-CA" sz="4400" spc="-1" dirty="0" smtClean="0">
                 <a:solidFill>
-                  <a:srgbClr val="FFFFFF"/>
+                  <a:srgbClr val="F2F2F2"/>
                 </a:solidFill>
                 <a:uFill>
                   <a:solidFill>
@@ -9132,7 +9289,7 @@
             </a:r>
             <a:endParaRPr lang="en-CA" sz="1800" b="0" strike="noStrike" spc="-1" dirty="0">
               <a:solidFill>
-                <a:srgbClr val="FFFFFF"/>
+                <a:srgbClr val="F2F2F2"/>
               </a:solidFill>
               <a:uFill>
                 <a:solidFill>
@@ -9190,9 +9347,9 @@
               <a:buChar char="•"/>
             </a:pPr>
             <a:r>
-              <a:rPr lang="en-CA" sz="3200" spc="-1" dirty="0" smtClean="0">
-                <a:solidFill>
-                  <a:srgbClr val="FFFFFF"/>
+              <a:rPr lang="en-CA" sz="2800" spc="-1" dirty="0" smtClean="0">
+                <a:solidFill>
+                  <a:srgbClr val="F2F2F2"/>
                 </a:solidFill>
                 <a:uFill>
                   <a:solidFill>
@@ -9201,11 +9358,53 @@
                 </a:uFill>
                 <a:latin typeface="Calibri"/>
               </a:rPr>
-              <a:t>In total, we had 1120 lines of code.  (Including internal documentation and tests.)</a:t>
-            </a:r>
-            <a:endParaRPr lang="en-CA" sz="3200" b="0" strike="noStrike" spc="-1" dirty="0">
+              <a:t>In total, we had 1120 lines of code.  (Including internal documentation and tests.</a:t>
+            </a:r>
+            <a:r>
+              <a:rPr lang="en-CA" sz="2800" spc="-1" dirty="0" smtClean="0">
+                <a:solidFill>
+                  <a:srgbClr val="F2F2F2"/>
+                </a:solidFill>
+                <a:uFill>
+                  <a:solidFill>
+                    <a:srgbClr val="FFFFFF"/>
+                  </a:solidFill>
+                </a:uFill>
+                <a:latin typeface="Calibri"/>
+              </a:rPr>
+              <a:t>)  </a:t>
+            </a:r>
+            <a:r>
+              <a:rPr lang="en-CA" sz="2800" spc="-1" dirty="0" err="1" smtClean="0">
+                <a:solidFill>
+                  <a:srgbClr val="F2F2F2"/>
+                </a:solidFill>
+                <a:uFill>
+                  <a:solidFill>
+                    <a:srgbClr val="FFFFFF"/>
+                  </a:solidFill>
+                </a:uFill>
+                <a:latin typeface="Calibri"/>
+              </a:rPr>
+              <a:t>Pylaga</a:t>
+            </a:r>
+            <a:r>
+              <a:rPr lang="en-CA" sz="2800" spc="-1" dirty="0" smtClean="0">
+                <a:solidFill>
+                  <a:srgbClr val="F2F2F2"/>
+                </a:solidFill>
+                <a:uFill>
+                  <a:solidFill>
+                    <a:srgbClr val="FFFFFF"/>
+                  </a:solidFill>
+                </a:uFill>
+                <a:latin typeface="Calibri"/>
+              </a:rPr>
+              <a:t> had 1445 lines total.</a:t>
+            </a:r>
+            <a:endParaRPr lang="en-CA" sz="2800" b="0" strike="noStrike" spc="-1" dirty="0">
               <a:solidFill>
-                <a:srgbClr val="FFFFFF"/>
+                <a:srgbClr val="F2F2F2"/>
               </a:solidFill>
               <a:uFill>
                 <a:solidFill>
@@ -9347,7 +9546,7 @@
             <a:r>
               <a:rPr lang="en-CA" sz="4400" spc="-1" dirty="0" smtClean="0">
                 <a:solidFill>
-                  <a:srgbClr val="FFFFFF"/>
+                  <a:srgbClr val="F2F2F2"/>
                 </a:solidFill>
                 <a:uFill>
                   <a:solidFill>
@@ -9360,7 +9559,7 @@
             </a:r>
             <a:endParaRPr lang="en-CA" sz="1800" b="0" strike="noStrike" spc="-1" dirty="0">
               <a:solidFill>
-                <a:srgbClr val="FFFFFF"/>
+                <a:srgbClr val="F2F2F2"/>
               </a:solidFill>
               <a:uFill>
                 <a:solidFill>
@@ -9418,9 +9617,9 @@
               <a:buChar char="•"/>
             </a:pPr>
             <a:r>
-              <a:rPr lang="en-CA" sz="3200" spc="-1" dirty="0" smtClean="0">
-                <a:solidFill>
-                  <a:srgbClr val="FFFFFF"/>
+              <a:rPr lang="en-CA" sz="2800" spc="-1" dirty="0" smtClean="0">
+                <a:solidFill>
+                  <a:srgbClr val="F2F2F2"/>
                 </a:solidFill>
                 <a:uFill>
                   <a:solidFill>
@@ -9429,11 +9628,53 @@
                 </a:uFill>
                 <a:latin typeface="Calibri"/>
               </a:rPr>
-              <a:t>There were a total of 84 functions.  When considering lines of code (including documentation) that makes each function/method around 13 lines long.</a:t>
-            </a:r>
-            <a:endParaRPr lang="en-CA" sz="3200" b="0" strike="noStrike" spc="-1" dirty="0">
+              <a:t>There were a total of 84 functions.  When considering lines of code (including documentation) that makes each function/method around 13 lines long</a:t>
+            </a:r>
+            <a:r>
+              <a:rPr lang="en-CA" sz="2800" spc="-1" dirty="0" smtClean="0">
+                <a:solidFill>
+                  <a:srgbClr val="F2F2F2"/>
+                </a:solidFill>
+                <a:uFill>
+                  <a:solidFill>
+                    <a:srgbClr val="FFFFFF"/>
+                  </a:solidFill>
+                </a:uFill>
+                <a:latin typeface="Calibri"/>
+              </a:rPr>
+              <a:t>.  </a:t>
+            </a:r>
+            <a:r>
+              <a:rPr lang="en-CA" sz="2800" spc="-1" dirty="0" err="1" smtClean="0">
+                <a:solidFill>
+                  <a:srgbClr val="F2F2F2"/>
+                </a:solidFill>
+                <a:uFill>
+                  <a:solidFill>
+                    <a:srgbClr val="FFFFFF"/>
+                  </a:solidFill>
+                </a:uFill>
+                <a:latin typeface="Calibri"/>
+              </a:rPr>
+              <a:t>Pylaga</a:t>
+            </a:r>
+            <a:r>
+              <a:rPr lang="en-CA" sz="2800" spc="-1" dirty="0" smtClean="0">
+                <a:solidFill>
+                  <a:srgbClr val="F2F2F2"/>
+                </a:solidFill>
+                <a:uFill>
+                  <a:solidFill>
+                    <a:srgbClr val="FFFFFF"/>
+                  </a:solidFill>
+                </a:uFill>
+                <a:latin typeface="Calibri"/>
+              </a:rPr>
+              <a:t> had a total of 106 (so, also around 13 lines per function.)</a:t>
+            </a:r>
+            <a:endParaRPr lang="en-CA" sz="2800" b="0" strike="noStrike" spc="-1" dirty="0">
               <a:solidFill>
-                <a:srgbClr val="FFFFFF"/>
+                <a:srgbClr val="F2F2F2"/>
               </a:solidFill>
               <a:uFill>
                 <a:solidFill>
@@ -9467,8 +9708,8 @@
         </p:blipFill>
         <p:spPr>
           <a:xfrm>
-            <a:off x="1918143" y="3711137"/>
-            <a:ext cx="5018802" cy="2956531"/>
+            <a:off x="2130243" y="3836083"/>
+            <a:ext cx="4806702" cy="2831585"/>
           </a:xfrm>
           <a:prstGeom prst="rect">
             <a:avLst/>
@@ -9575,7 +9816,7 @@
             <a:r>
               <a:rPr lang="en-CA" sz="4400" spc="-1" dirty="0" smtClean="0">
                 <a:solidFill>
-                  <a:srgbClr val="FFFFFF"/>
+                  <a:srgbClr val="F2F2F2"/>
                 </a:solidFill>
                 <a:uFill>
                   <a:solidFill>
@@ -9588,7 +9829,7 @@
             </a:r>
             <a:endParaRPr lang="en-CA" sz="1800" b="0" strike="noStrike" spc="-1" dirty="0">
               <a:solidFill>
-                <a:srgbClr val="FFFFFF"/>
+                <a:srgbClr val="F2F2F2"/>
               </a:solidFill>
               <a:uFill>
                 <a:solidFill>
@@ -9639,6 +9880,9 @@
               <a:lnSpc>
                 <a:spcPct val="100000"/>
               </a:lnSpc>
+              <a:spcAft>
+                <a:spcPts val="1200"/>
+              </a:spcAft>
               <a:buClr>
                 <a:srgbClr val="FFFFFF"/>
               </a:buClr>
@@ -9646,9 +9890,9 @@
               <a:buChar char="•"/>
             </a:pPr>
             <a:r>
-              <a:rPr lang="en-CA" sz="3200" b="0" strike="noStrike" spc="-1" dirty="0" smtClean="0">
-                <a:solidFill>
-                  <a:srgbClr val="FFFFFF"/>
+              <a:rPr lang="en-CA" sz="2800" b="0" strike="noStrike" spc="-1" dirty="0" smtClean="0">
+                <a:solidFill>
+                  <a:srgbClr val="F2F2F2"/>
                 </a:solidFill>
                 <a:uFill>
                   <a:solidFill>
@@ -9660,9 +9904,9 @@
               <a:t>We made use of the Spiral Method to implement </a:t>
             </a:r>
             <a:r>
-              <a:rPr lang="en-CA" sz="3200" b="0" strike="noStrike" spc="-1" dirty="0" err="1" smtClean="0">
-                <a:solidFill>
-                  <a:srgbClr val="FFFFFF"/>
+              <a:rPr lang="en-CA" sz="2800" b="0" strike="noStrike" spc="-1" dirty="0" err="1" smtClean="0">
+                <a:solidFill>
+                  <a:srgbClr val="F2F2F2"/>
                 </a:solidFill>
                 <a:uFill>
                   <a:solidFill>
@@ -9674,9 +9918,9 @@
               <a:t>LazerBlast</a:t>
             </a:r>
             <a:r>
-              <a:rPr lang="en-CA" sz="3200" b="0" strike="noStrike" spc="-1" dirty="0" smtClean="0">
-                <a:solidFill>
-                  <a:srgbClr val="FFFFFF"/>
+              <a:rPr lang="en-CA" sz="2800" b="0" strike="noStrike" spc="-1" dirty="0" smtClean="0">
+                <a:solidFill>
+                  <a:srgbClr val="F2F2F2"/>
                 </a:solidFill>
                 <a:uFill>
                   <a:solidFill>
@@ -9689,10 +9933,10 @@
             </a:r>
           </a:p>
           <a:p>
-            <a:pPr marL="343080" indent="-339840">
-              <a:lnSpc>
-                <a:spcPct val="100000"/>
-              </a:lnSpc>
+            <a:pPr marL="800280" lvl="1" indent="-339840">
+              <a:spcAft>
+                <a:spcPts val="1200"/>
+              </a:spcAft>
               <a:buClr>
                 <a:srgbClr val="FFFFFF"/>
               </a:buClr>
@@ -9700,9 +9944,9 @@
               <a:buChar char="•"/>
             </a:pPr>
             <a:r>
-              <a:rPr lang="en-CA" sz="3200" spc="-1" dirty="0" smtClean="0">
-                <a:solidFill>
-                  <a:srgbClr val="FFFFFF"/>
+              <a:rPr lang="en-CA" sz="2800" spc="-1" dirty="0" smtClean="0">
+                <a:solidFill>
+                  <a:srgbClr val="F2F2F2"/>
                 </a:solidFill>
                 <a:uFill>
                   <a:solidFill>
@@ -9711,14 +9955,28 @@
                 </a:uFill>
                 <a:latin typeface="Calibri"/>
               </a:rPr>
-              <a:t>For example, when developing the graphics, we first rendered each player as a simple box, then in the next go around added color, and finally added actual images.</a:t>
-            </a:r>
+              <a:t>In the first iteration, we created base classes for objects which are rendered and in motion.  This gave the game more structure.</a:t>
+            </a:r>
+            <a:endParaRPr lang="en-CA" sz="2800" spc="-1" dirty="0" smtClean="0">
+              <a:solidFill>
+                <a:srgbClr val="F2F2F2"/>
+              </a:solidFill>
+              <a:uFill>
+                <a:solidFill>
+                  <a:srgbClr val="FFFFFF"/>
+                </a:solidFill>
+              </a:uFill>
+              <a:latin typeface="Calibri"/>
+            </a:endParaRPr>
           </a:p>
           <a:p>
             <a:pPr marL="343080" indent="-339840">
               <a:lnSpc>
                 <a:spcPct val="100000"/>
               </a:lnSpc>
+              <a:spcAft>
+                <a:spcPts val="1200"/>
+              </a:spcAft>
               <a:buClr>
                 <a:srgbClr val="FFFFFF"/>
               </a:buClr>
@@ -9726,9 +9984,9 @@
               <a:buChar char="•"/>
             </a:pPr>
             <a:r>
-              <a:rPr lang="en-CA" sz="3200" spc="-1" dirty="0" smtClean="0">
-                <a:solidFill>
-                  <a:srgbClr val="FFFFFF"/>
+              <a:rPr lang="en-CA" sz="2800" spc="-1" dirty="0" smtClean="0">
+                <a:solidFill>
+                  <a:srgbClr val="F2F2F2"/>
                 </a:solidFill>
                 <a:uFill>
                   <a:solidFill>
@@ -9737,11 +9995,51 @@
                 </a:uFill>
                 <a:latin typeface="Calibri"/>
               </a:rPr>
-              <a:t>In addition, we  used Test Driven Development for each arm of the spiral.</a:t>
-            </a:r>
-            <a:endParaRPr lang="en-CA" sz="3200" b="0" strike="noStrike" spc="-1" dirty="0">
+              <a:t>In addition, we  used Test Driven Development for each arm of the spiral</a:t>
+            </a:r>
+            <a:r>
+              <a:rPr lang="en-CA" sz="2800" spc="-1" dirty="0" smtClean="0">
+                <a:solidFill>
+                  <a:srgbClr val="F2F2F2"/>
+                </a:solidFill>
+                <a:uFill>
+                  <a:solidFill>
+                    <a:srgbClr val="FFFFFF"/>
+                  </a:solidFill>
+                </a:uFill>
+                <a:latin typeface="Calibri"/>
+              </a:rPr>
+              <a:t>.</a:t>
+            </a:r>
+          </a:p>
+          <a:p>
+            <a:pPr marL="800280" lvl="1" indent="-339840">
+              <a:spcAft>
+                <a:spcPts val="1200"/>
+              </a:spcAft>
+              <a:buClr>
+                <a:srgbClr val="FFFFFF"/>
+              </a:buClr>
+              <a:buFont typeface="Arial"/>
+              <a:buChar char="•"/>
+            </a:pPr>
+            <a:r>
+              <a:rPr lang="en-CA" sz="2800" b="0" strike="noStrike" spc="-1" dirty="0" smtClean="0">
+                <a:solidFill>
+                  <a:srgbClr val="F2F2F2"/>
+                </a:solidFill>
+                <a:uFill>
+                  <a:solidFill>
+                    <a:srgbClr val="FFFFFF"/>
+                  </a:solidFill>
+                </a:uFill>
+                <a:latin typeface="Calibri"/>
+              </a:rPr>
+              <a:t>Tests are primarily on the base classes and models.</a:t>
+            </a:r>
+            <a:endParaRPr lang="en-CA" sz="2800" b="0" strike="noStrike" spc="-1" dirty="0">
               <a:solidFill>
-                <a:srgbClr val="FFFFFF"/>
+                <a:srgbClr val="F2F2F2"/>
               </a:solidFill>
               <a:uFill>
                 <a:solidFill>
@@ -9846,7 +10144,7 @@
             <a:r>
               <a:rPr lang="en-CA" sz="2000" spc="-1" dirty="0" smtClean="0">
                 <a:solidFill>
-                  <a:srgbClr val="FFFFFF"/>
+                  <a:srgbClr val="F2F2F2"/>
                 </a:solidFill>
                 <a:uFill>
                   <a:solidFill>
@@ -9869,7 +10167,7 @@
             <a:r>
               <a:rPr lang="en-CA" sz="2000" spc="-1" dirty="0" smtClean="0">
                 <a:solidFill>
-                  <a:srgbClr val="FFFFFF"/>
+                  <a:srgbClr val="F2F2F2"/>
                 </a:solidFill>
                 <a:uFill>
                   <a:solidFill>
@@ -9882,7 +10180,7 @@
             </a:r>
             <a:endParaRPr lang="en-CA" sz="1200" spc="-1" dirty="0" smtClean="0">
               <a:solidFill>
-                <a:srgbClr val="FFFFFF"/>
+                <a:srgbClr val="F2F2F2"/>
               </a:solidFill>
               <a:uFill>
                 <a:solidFill>
@@ -9906,7 +10204,7 @@
             <a:r>
               <a:rPr lang="en-CA" sz="2000" spc="-1" dirty="0" smtClean="0">
                 <a:solidFill>
-                  <a:srgbClr val="FFFFFF"/>
+                  <a:srgbClr val="F2F2F2"/>
                 </a:solidFill>
                 <a:uFill>
                   <a:solidFill>
@@ -9921,7 +10219,7 @@
             <a:r>
               <a:rPr lang="en-CA" sz="2000" spc="-1" dirty="0" err="1" smtClean="0">
                 <a:solidFill>
-                  <a:srgbClr val="FFFFFF"/>
+                  <a:srgbClr val="F2F2F2"/>
                 </a:solidFill>
                 <a:uFill>
                   <a:solidFill>
@@ -9936,7 +10234,7 @@
             <a:r>
               <a:rPr lang="en-CA" sz="2000" spc="-1" dirty="0" smtClean="0">
                 <a:solidFill>
-                  <a:srgbClr val="FFFFFF"/>
+                  <a:srgbClr val="F2F2F2"/>
                 </a:solidFill>
                 <a:uFill>
                   <a:solidFill>
@@ -9960,7 +10258,7 @@
             <a:r>
               <a:rPr lang="en-CA" sz="2000" spc="-1" dirty="0" smtClean="0">
                 <a:solidFill>
-                  <a:srgbClr val="FFFFFF"/>
+                  <a:srgbClr val="F2F2F2"/>
                 </a:solidFill>
                 <a:uFill>
                   <a:solidFill>
@@ -9987,7 +10285,7 @@
             <a:r>
               <a:rPr lang="en-CA" sz="2000" spc="-1" dirty="0" smtClean="0">
                 <a:solidFill>
-                  <a:srgbClr val="FFFFFF"/>
+                  <a:srgbClr val="F2F2F2"/>
                 </a:solidFill>
                 <a:uFill>
                   <a:solidFill>
@@ -10011,7 +10309,7 @@
             <a:r>
               <a:rPr lang="en-CA" sz="2000" spc="-1" dirty="0" smtClean="0">
                 <a:solidFill>
-                  <a:srgbClr val="FFFFFF"/>
+                  <a:srgbClr val="F2F2F2"/>
                 </a:solidFill>
                 <a:uFill>
                   <a:solidFill>
@@ -10025,7 +10323,7 @@
             </a:r>
             <a:endParaRPr lang="en-CA" sz="2400" spc="-1" dirty="0">
               <a:solidFill>
-                <a:srgbClr val="FFFFFF"/>
+                <a:srgbClr val="F2F2F2"/>
               </a:solidFill>
               <a:uFill>
                 <a:solidFill>
@@ -10081,7 +10379,7 @@
             <a:r>
               <a:rPr lang="en-CA" sz="4400" b="0" strike="noStrike" spc="-1" dirty="0" smtClean="0">
                 <a:solidFill>
-                  <a:srgbClr val="FFFFFF"/>
+                  <a:srgbClr val="F2F2F2"/>
                 </a:solidFill>
                 <a:uFill>
                   <a:solidFill>
@@ -10096,7 +10394,7 @@
             <a:r>
               <a:rPr lang="en-CA" sz="4400" b="0" strike="noStrike" spc="-1" dirty="0">
                 <a:solidFill>
-                  <a:srgbClr val="FFFFFF"/>
+                  <a:srgbClr val="F2F2F2"/>
                 </a:solidFill>
                 <a:uFill>
                   <a:solidFill>
@@ -10110,7 +10408,7 @@
             </a:r>
             <a:endParaRPr lang="en-CA" sz="1800" b="0" strike="noStrike" spc="-1" dirty="0">
               <a:solidFill>
-                <a:srgbClr val="FFFFFF"/>
+                <a:srgbClr val="F2F2F2"/>
               </a:solidFill>
               <a:uFill>
                 <a:solidFill>
@@ -10651,7 +10949,7 @@
   <a:extraClrSchemeLst/>
   <a:extLst>
     <a:ext uri="{05A4C25C-085E-4340-85A3-A5531E510DB2}">
-      <thm15:themeFamily xmlns:thm15="http://schemas.microsoft.com/office/thememl/2012/main" xmlns="" name="Vapor Trail" id="{4FDF2955-7D9C-493C-B9F9-C205151B46CD}" vid="{8F31A783-2159-4870-BC29-2BA7D038EA44}"/>
+      <thm15:themeFamily xmlns="" xmlns:thm15="http://schemas.microsoft.com/office/thememl/2012/main" name="Vapor Trail" id="{4FDF2955-7D9C-493C-B9F9-C205151B46CD}" vid="{8F31A783-2159-4870-BC29-2BA7D038EA44}"/>
     </a:ext>
   </a:extLst>
 </a:theme>
@@ -10912,7 +11210,7 @@
   <a:extraClrSchemeLst/>
   <a:extLst>
     <a:ext uri="{05A4C25C-085E-4340-85A3-A5531E510DB2}">
-      <thm15:themeFamily xmlns:thm15="http://schemas.microsoft.com/office/thememl/2012/main" xmlns="" name="Office Theme" id="{62F939B6-93AF-4DB8-9C6B-D6C7DFDC589F}" vid="{4A3C46E8-61CC-4603-A589-7422A47A8E4A}"/>
+      <thm15:themeFamily xmlns="" xmlns:thm15="http://schemas.microsoft.com/office/thememl/2012/main" name="Office Theme" id="{62F939B6-93AF-4DB8-9C6B-D6C7DFDC589F}" vid="{4A3C46E8-61CC-4603-A589-7422A47A8E4A}"/>
     </a:ext>
   </a:extLst>
 </a:theme>

</xml_diff>